<commit_message>
updated demo for cuda
</commit_message>
<xml_diff>
--- a/figures/benchmark/table1_SNPmanifold.pptx
+++ b/figures/benchmark/table1_SNPmanifold.pptx
@@ -197,7 +197,7 @@
           <a:p>
             <a:fld id="{2CC912F6-2FDA-46CB-AB31-B7FB35F6AD1C}" type="datetimeFigureOut">
               <a:rPr lang="zh-HK" altLang="en-US" smtClean="0"/>
-              <a:t>2/5/2025</a:t>
+              <a:t>13/5/2025</a:t>
             </a:fld>
             <a:endParaRPr lang="zh-HK" altLang="en-US"/>
           </a:p>
@@ -709,7 +709,7 @@
           <a:p>
             <a:fld id="{C74143BD-B8EC-6E48-B8CE-67BFBF273CF9}" type="datetimeFigureOut">
               <a:rPr lang="en-US" smtClean="0"/>
-              <a:t>5/2/2025</a:t>
+              <a:t>5/13/2025</a:t>
             </a:fld>
             <a:endParaRPr lang="en-US"/>
           </a:p>
@@ -879,7 +879,7 @@
           <a:p>
             <a:fld id="{C74143BD-B8EC-6E48-B8CE-67BFBF273CF9}" type="datetimeFigureOut">
               <a:rPr lang="en-US" smtClean="0"/>
-              <a:t>5/2/2025</a:t>
+              <a:t>5/13/2025</a:t>
             </a:fld>
             <a:endParaRPr lang="en-US"/>
           </a:p>
@@ -1059,7 +1059,7 @@
           <a:p>
             <a:fld id="{C74143BD-B8EC-6E48-B8CE-67BFBF273CF9}" type="datetimeFigureOut">
               <a:rPr lang="en-US" smtClean="0"/>
-              <a:t>5/2/2025</a:t>
+              <a:t>5/13/2025</a:t>
             </a:fld>
             <a:endParaRPr lang="en-US"/>
           </a:p>
@@ -1229,7 +1229,7 @@
           <a:p>
             <a:fld id="{C74143BD-B8EC-6E48-B8CE-67BFBF273CF9}" type="datetimeFigureOut">
               <a:rPr lang="en-US" smtClean="0"/>
-              <a:t>5/2/2025</a:t>
+              <a:t>5/13/2025</a:t>
             </a:fld>
             <a:endParaRPr lang="en-US"/>
           </a:p>
@@ -1475,7 +1475,7 @@
           <a:p>
             <a:fld id="{C74143BD-B8EC-6E48-B8CE-67BFBF273CF9}" type="datetimeFigureOut">
               <a:rPr lang="en-US" smtClean="0"/>
-              <a:t>5/2/2025</a:t>
+              <a:t>5/13/2025</a:t>
             </a:fld>
             <a:endParaRPr lang="en-US"/>
           </a:p>
@@ -1707,7 +1707,7 @@
           <a:p>
             <a:fld id="{C74143BD-B8EC-6E48-B8CE-67BFBF273CF9}" type="datetimeFigureOut">
               <a:rPr lang="en-US" smtClean="0"/>
-              <a:t>5/2/2025</a:t>
+              <a:t>5/13/2025</a:t>
             </a:fld>
             <a:endParaRPr lang="en-US"/>
           </a:p>
@@ -2074,7 +2074,7 @@
           <a:p>
             <a:fld id="{C74143BD-B8EC-6E48-B8CE-67BFBF273CF9}" type="datetimeFigureOut">
               <a:rPr lang="en-US" smtClean="0"/>
-              <a:t>5/2/2025</a:t>
+              <a:t>5/13/2025</a:t>
             </a:fld>
             <a:endParaRPr lang="en-US"/>
           </a:p>
@@ -2192,7 +2192,7 @@
           <a:p>
             <a:fld id="{C74143BD-B8EC-6E48-B8CE-67BFBF273CF9}" type="datetimeFigureOut">
               <a:rPr lang="en-US" smtClean="0"/>
-              <a:t>5/2/2025</a:t>
+              <a:t>5/13/2025</a:t>
             </a:fld>
             <a:endParaRPr lang="en-US"/>
           </a:p>
@@ -2287,7 +2287,7 @@
           <a:p>
             <a:fld id="{C74143BD-B8EC-6E48-B8CE-67BFBF273CF9}" type="datetimeFigureOut">
               <a:rPr lang="en-US" smtClean="0"/>
-              <a:t>5/2/2025</a:t>
+              <a:t>5/13/2025</a:t>
             </a:fld>
             <a:endParaRPr lang="en-US"/>
           </a:p>
@@ -2564,7 +2564,7 @@
           <a:p>
             <a:fld id="{C74143BD-B8EC-6E48-B8CE-67BFBF273CF9}" type="datetimeFigureOut">
               <a:rPr lang="en-US" smtClean="0"/>
-              <a:t>5/2/2025</a:t>
+              <a:t>5/13/2025</a:t>
             </a:fld>
             <a:endParaRPr lang="en-US"/>
           </a:p>
@@ -2821,7 +2821,7 @@
           <a:p>
             <a:fld id="{C74143BD-B8EC-6E48-B8CE-67BFBF273CF9}" type="datetimeFigureOut">
               <a:rPr lang="en-US" smtClean="0"/>
-              <a:t>5/2/2025</a:t>
+              <a:t>5/13/2025</a:t>
             </a:fld>
             <a:endParaRPr lang="en-US"/>
           </a:p>
@@ -3034,7 +3034,7 @@
           <a:p>
             <a:fld id="{C74143BD-B8EC-6E48-B8CE-67BFBF273CF9}" type="datetimeFigureOut">
               <a:rPr lang="en-US" smtClean="0"/>
-              <a:t>5/2/2025</a:t>
+              <a:t>5/13/2025</a:t>
             </a:fld>
             <a:endParaRPr lang="en-US"/>
           </a:p>
@@ -3460,7 +3460,7 @@
           <p:nvPr>
             <p:extLst>
               <p:ext uri="{D42A27DB-BD31-4B8C-83A1-F6EECF244321}">
-                <p14:modId xmlns:p14="http://schemas.microsoft.com/office/powerpoint/2010/main" val="3849248668"/>
+                <p14:modId xmlns:p14="http://schemas.microsoft.com/office/powerpoint/2010/main" val="3038508768"/>
               </p:ext>
             </p:extLst>
           </p:nvPr>
@@ -4011,7 +4011,11 @@
                       </a:endParaRPr>
                     </a:p>
                   </a:txBody>
-                  <a:tcPr marL="5546" marR="5546" marT="5546" marB="0" anchor="ctr"/>
+                  <a:tcPr marL="5546" marR="5546" marT="5546" marB="0" anchor="ctr">
+                    <a:lnB>
+                      <a:noFill/>
+                    </a:lnB>
+                  </a:tcPr>
                 </a:tc>
                 <a:tc>
                   <a:txBody>
@@ -4087,7 +4091,11 @@
                       </a:r>
                     </a:p>
                   </a:txBody>
-                  <a:tcPr marL="5546" marR="5546" marT="5546" marB="0" anchor="ctr"/>
+                  <a:tcPr marL="5546" marR="5546" marT="5546" marB="0" anchor="ctr">
+                    <a:lnB>
+                      <a:noFill/>
+                    </a:lnB>
+                  </a:tcPr>
                 </a:tc>
                 <a:tc>
                   <a:txBody>
@@ -4110,7 +4118,11 @@
                       </a:endParaRPr>
                     </a:p>
                   </a:txBody>
-                  <a:tcPr marL="5546" marR="5546" marT="5546" marB="0" anchor="ctr"/>
+                  <a:tcPr marL="5546" marR="5546" marT="5546" marB="0" anchor="ctr">
+                    <a:lnB>
+                      <a:noFill/>
+                    </a:lnB>
+                  </a:tcPr>
                 </a:tc>
                 <a:tc>
                   <a:txBody>
@@ -4127,13 +4139,22 @@
                         <a:buNone/>
                       </a:pPr>
                       <a:r>
+                        <a:rPr lang="en-US" sz="600" kern="100">
+                          <a:effectLst/>
+                          <a:latin typeface="+mn-lt"/>
+                          <a:ea typeface="DengXian" panose="02010600030101010101" pitchFamily="2" charset="-122"/>
+                          <a:cs typeface="Times New Roman" panose="02020603050405020304" pitchFamily="18" charset="0"/>
+                        </a:rPr>
+                        <a:t>Mixture model involving </a:t>
+                      </a:r>
+                      <a:r>
                         <a:rPr lang="en-US" sz="600" kern="100" dirty="0">
                           <a:effectLst/>
                           <a:latin typeface="+mn-lt"/>
                           <a:ea typeface="DengXian" panose="02010600030101010101" pitchFamily="2" charset="-122"/>
                           <a:cs typeface="Times New Roman" panose="02020603050405020304" pitchFamily="18" charset="0"/>
                         </a:rPr>
-                        <a:t>Factor analysis involving vectors of SNPs</a:t>
+                        <a:t>vectors of SNPs</a:t>
                       </a:r>
                       <a:endParaRPr lang="zh-TW" sz="600" kern="100" dirty="0">
                         <a:effectLst/>
@@ -4143,7 +4164,11 @@
                       </a:endParaRPr>
                     </a:p>
                   </a:txBody>
-                  <a:tcPr marL="65311" marR="65311" marT="0" marB="0" anchor="ctr"/>
+                  <a:tcPr marL="65311" marR="65311" marT="0" marB="0" anchor="ctr">
+                    <a:lnB>
+                      <a:noFill/>
+                    </a:lnB>
+                  </a:tcPr>
                 </a:tc>
                 <a:tc>
                   <a:txBody>
@@ -4176,7 +4201,11 @@
                       </a:endParaRPr>
                     </a:p>
                   </a:txBody>
-                  <a:tcPr marL="65311" marR="65311" marT="0" marB="0" anchor="ctr"/>
+                  <a:tcPr marL="65311" marR="65311" marT="0" marB="0" anchor="ctr">
+                    <a:lnB>
+                      <a:noFill/>
+                    </a:lnB>
+                  </a:tcPr>
                 </a:tc>
                 <a:extLst>
                   <a:ext uri="{0D108BD9-81ED-4DB2-BD59-A6C34878D82A}">
@@ -4206,7 +4235,34 @@
                       </a:endParaRPr>
                     </a:p>
                   </a:txBody>
-                  <a:tcPr marL="5546" marR="5546" marT="5546" marB="0" anchor="ctr"/>
+                  <a:tcPr marL="5546" marR="5546" marT="5546" marB="0" anchor="ctr">
+                    <a:lnL>
+                      <a:noFill/>
+                    </a:lnL>
+                    <a:lnR>
+                      <a:noFill/>
+                    </a:lnR>
+                    <a:lnT>
+                      <a:noFill/>
+                    </a:lnT>
+                    <a:lnB w="12700" cap="flat" cmpd="sng" algn="ctr">
+                      <a:solidFill>
+                        <a:schemeClr val="tx1"/>
+                      </a:solidFill>
+                      <a:prstDash val="solid"/>
+                      <a:round/>
+                      <a:headEnd type="none" w="med" len="med"/>
+                      <a:tailEnd type="none" w="med" len="med"/>
+                    </a:lnB>
+                    <a:lnTlToBr w="12700" cmpd="sng">
+                      <a:noFill/>
+                      <a:prstDash val="solid"/>
+                    </a:lnTlToBr>
+                    <a:lnBlToTr w="12700" cmpd="sng">
+                      <a:noFill/>
+                      <a:prstDash val="solid"/>
+                    </a:lnBlToTr>
+                  </a:tcPr>
                 </a:tc>
                 <a:tc>
                   <a:txBody>
@@ -4246,7 +4302,34 @@
                       </a:r>
                     </a:p>
                   </a:txBody>
-                  <a:tcPr marL="5546" marR="5546" marT="5546" marB="0" anchor="ctr"/>
+                  <a:tcPr marL="5546" marR="5546" marT="5546" marB="0" anchor="ctr">
+                    <a:lnL>
+                      <a:noFill/>
+                    </a:lnL>
+                    <a:lnR>
+                      <a:noFill/>
+                    </a:lnR>
+                    <a:lnT>
+                      <a:noFill/>
+                    </a:lnT>
+                    <a:lnB w="12700" cap="flat" cmpd="sng" algn="ctr">
+                      <a:solidFill>
+                        <a:schemeClr val="tx1"/>
+                      </a:solidFill>
+                      <a:prstDash val="solid"/>
+                      <a:round/>
+                      <a:headEnd type="none" w="med" len="med"/>
+                      <a:tailEnd type="none" w="med" len="med"/>
+                    </a:lnB>
+                    <a:lnTlToBr w="12700" cmpd="sng">
+                      <a:noFill/>
+                      <a:prstDash val="solid"/>
+                    </a:lnTlToBr>
+                    <a:lnBlToTr w="12700" cmpd="sng">
+                      <a:noFill/>
+                      <a:prstDash val="solid"/>
+                    </a:lnBlToTr>
+                  </a:tcPr>
                 </a:tc>
                 <a:tc>
                   <a:txBody>
@@ -4269,7 +4352,34 @@
                       </a:endParaRPr>
                     </a:p>
                   </a:txBody>
-                  <a:tcPr marL="5546" marR="5546" marT="5546" marB="0" anchor="ctr"/>
+                  <a:tcPr marL="5546" marR="5546" marT="5546" marB="0" anchor="ctr">
+                    <a:lnL>
+                      <a:noFill/>
+                    </a:lnL>
+                    <a:lnR>
+                      <a:noFill/>
+                    </a:lnR>
+                    <a:lnT>
+                      <a:noFill/>
+                    </a:lnT>
+                    <a:lnB w="12700" cap="flat" cmpd="sng" algn="ctr">
+                      <a:solidFill>
+                        <a:schemeClr val="tx1"/>
+                      </a:solidFill>
+                      <a:prstDash val="solid"/>
+                      <a:round/>
+                      <a:headEnd type="none" w="med" len="med"/>
+                      <a:tailEnd type="none" w="med" len="med"/>
+                    </a:lnB>
+                    <a:lnTlToBr w="12700" cmpd="sng">
+                      <a:noFill/>
+                      <a:prstDash val="solid"/>
+                    </a:lnTlToBr>
+                    <a:lnBlToTr w="12700" cmpd="sng">
+                      <a:noFill/>
+                      <a:prstDash val="solid"/>
+                    </a:lnBlToTr>
+                  </a:tcPr>
                 </a:tc>
                 <a:tc>
                   <a:txBody>
@@ -4302,7 +4412,34 @@
                       </a:endParaRPr>
                     </a:p>
                   </a:txBody>
-                  <a:tcPr marL="65311" marR="65311" marT="0" marB="0" anchor="ctr"/>
+                  <a:tcPr marL="65311" marR="65311" marT="0" marB="0" anchor="ctr">
+                    <a:lnL>
+                      <a:noFill/>
+                    </a:lnL>
+                    <a:lnR>
+                      <a:noFill/>
+                    </a:lnR>
+                    <a:lnT>
+                      <a:noFill/>
+                    </a:lnT>
+                    <a:lnB w="12700" cap="flat" cmpd="sng" algn="ctr">
+                      <a:solidFill>
+                        <a:schemeClr val="tx1"/>
+                      </a:solidFill>
+                      <a:prstDash val="solid"/>
+                      <a:round/>
+                      <a:headEnd type="none" w="med" len="med"/>
+                      <a:tailEnd type="none" w="med" len="med"/>
+                    </a:lnB>
+                    <a:lnTlToBr w="12700" cmpd="sng">
+                      <a:noFill/>
+                      <a:prstDash val="solid"/>
+                    </a:lnTlToBr>
+                    <a:lnBlToTr w="12700" cmpd="sng">
+                      <a:noFill/>
+                      <a:prstDash val="solid"/>
+                    </a:lnBlToTr>
+                  </a:tcPr>
                 </a:tc>
                 <a:tc>
                   <a:txBody>
@@ -4335,7 +4472,34 @@
                       </a:endParaRPr>
                     </a:p>
                   </a:txBody>
-                  <a:tcPr marL="65311" marR="65311" marT="0" marB="0" anchor="ctr"/>
+                  <a:tcPr marL="65311" marR="65311" marT="0" marB="0" anchor="ctr">
+                    <a:lnL>
+                      <a:noFill/>
+                    </a:lnL>
+                    <a:lnR>
+                      <a:noFill/>
+                    </a:lnR>
+                    <a:lnT>
+                      <a:noFill/>
+                    </a:lnT>
+                    <a:lnB w="12700" cap="flat" cmpd="sng" algn="ctr">
+                      <a:solidFill>
+                        <a:schemeClr val="tx1"/>
+                      </a:solidFill>
+                      <a:prstDash val="solid"/>
+                      <a:round/>
+                      <a:headEnd type="none" w="med" len="med"/>
+                      <a:tailEnd type="none" w="med" len="med"/>
+                    </a:lnB>
+                    <a:lnTlToBr w="12700" cmpd="sng">
+                      <a:noFill/>
+                      <a:prstDash val="solid"/>
+                    </a:lnTlToBr>
+                    <a:lnBlToTr w="12700" cmpd="sng">
+                      <a:noFill/>
+                      <a:prstDash val="solid"/>
+                    </a:lnBlToTr>
+                  </a:tcPr>
                 </a:tc>
                 <a:extLst>
                   <a:ext uri="{0D108BD9-81ED-4DB2-BD59-A6C34878D82A}">
@@ -4361,7 +4525,7 @@
         </p:nvSpPr>
         <p:spPr>
           <a:xfrm>
-            <a:off x="-54882" y="2494857"/>
+            <a:off x="-54882" y="2514737"/>
             <a:ext cx="4662687" cy="360548"/>
           </a:xfrm>
           <a:prstGeom prst="rect">

</xml_diff>